<commit_message>
justification for model removal from selection table
</commit_message>
<xml_diff>
--- a/figures/fig1/fig1.pptx
+++ b/figures/fig1/fig1.pptx
@@ -258,7 +258,7 @@
       </p15:sldGuideLst>
     </p:ext>
     <p:ext uri="http://customooxmlschemas.google.com/">
-      <go:slidesCustomData xmlns="" xmlns:mc="http://schemas.openxmlformats.org/markup-compatibility/2006" xmlns:mv="urn:schemas-microsoft-com:mac:vml" xmlns:c="http://schemas.openxmlformats.org/drawingml/2006/chart" xmlns:dgm="http://schemas.openxmlformats.org/drawingml/2006/diagram" xmlns:o="urn:schemas-microsoft-com:office:office" xmlns:v="urn:schemas-microsoft-com:vml" xmlns:pvml="urn:schemas-microsoft-com:office:powerpoint" xmlns:com="http://schemas.openxmlformats.org/drawingml/2006/compatibility" xmlns:p14="http://schemas.microsoft.com/office/powerpoint/2010/main" xmlns:p15="http://schemas.microsoft.com/office/powerpoint/2012/main" xmlns:ahyp="http://schemas.microsoft.com/office/drawing/2018/hyperlinkcolor" xmlns:go="http://customooxmlschemas.google.com/" r:id="rId10" roundtripDataSignature="AMtx7mhiytGPk8UOxiAGs9KaAxakDbg4SQ=="/>
+      <go:slidesCustomData xmlns:go="http://customooxmlschemas.google.com/" xmlns:ahyp="http://schemas.microsoft.com/office/drawing/2018/hyperlinkcolor" xmlns:p15="http://schemas.microsoft.com/office/powerpoint/2012/main" xmlns:p14="http://schemas.microsoft.com/office/powerpoint/2010/main" xmlns:com="http://schemas.openxmlformats.org/drawingml/2006/compatibility" xmlns:pvml="urn:schemas-microsoft-com:office:powerpoint" xmlns:v="urn:schemas-microsoft-com:vml" xmlns:o="urn:schemas-microsoft-com:office:office" xmlns:dgm="http://schemas.openxmlformats.org/drawingml/2006/diagram" xmlns:c="http://schemas.openxmlformats.org/drawingml/2006/chart" xmlns:mv="urn:schemas-microsoft-com:mac:vml" xmlns:mc="http://schemas.openxmlformats.org/markup-compatibility/2006" xmlns="" r:id="rId10" roundtripDataSignature="AMtx7mhiytGPk8UOxiAGs9KaAxakDbg4SQ=="/>
     </p:ext>
   </p:extLst>
 </p:presentation>
@@ -12836,6 +12836,42 @@
           <a:chExt cx="0" cy="0"/>
         </a:xfrm>
       </p:grpSpPr>
+      <p:pic>
+        <p:nvPicPr>
+          <p:cNvPr id="4" name="Graphic 3">
+            <a:extLst>
+              <a:ext uri="{FF2B5EF4-FFF2-40B4-BE49-F238E27FC236}">
+                <a16:creationId xmlns:a16="http://schemas.microsoft.com/office/drawing/2014/main" id="{22B0A3EE-6EEF-B568-7A07-240C948FA381}"/>
+              </a:ext>
+            </a:extLst>
+          </p:cNvPr>
+          <p:cNvPicPr>
+            <a:picLocks noChangeAspect="1"/>
+          </p:cNvPicPr>
+          <p:nvPr/>
+        </p:nvPicPr>
+        <p:blipFill>
+          <a:blip r:embed="rId3">
+            <a:extLst>
+              <a:ext uri="{96DAC541-7B7A-43D3-8B79-37D633B846F1}">
+                <asvg:svgBlip xmlns:asvg="http://schemas.microsoft.com/office/drawing/2016/SVG/main" r:embed="rId4"/>
+              </a:ext>
+            </a:extLst>
+          </a:blip>
+          <a:stretch>
+            <a:fillRect/>
+          </a:stretch>
+        </p:blipFill>
+        <p:spPr>
+          <a:xfrm>
+            <a:off x="0" y="9853684"/>
+            <a:ext cx="36576000" cy="23064716"/>
+          </a:xfrm>
+          <a:prstGeom prst="rect">
+            <a:avLst/>
+          </a:prstGeom>
+        </p:spPr>
+      </p:pic>
       <p:sp>
         <p:nvSpPr>
           <p:cNvPr id="107" name="TextBox 106">
@@ -13111,10 +13147,10 @@
               <p:nvPr/>
             </p:nvPicPr>
             <p:blipFill>
-              <a:blip r:embed="rId3">
+              <a:blip r:embed="rId5">
                 <a:extLst>
                   <a:ext uri="{96DAC541-7B7A-43D3-8B79-37D633B846F1}">
-                    <asvg:svgBlip xmlns:asvg="http://schemas.microsoft.com/office/drawing/2016/SVG/main" r:embed="rId4"/>
+                    <asvg:svgBlip xmlns:asvg="http://schemas.microsoft.com/office/drawing/2016/SVG/main" r:embed="rId6"/>
                   </a:ext>
                 </a:extLst>
               </a:blip>
@@ -13253,10 +13289,10 @@
               <p:nvPr/>
             </p:nvPicPr>
             <p:blipFill>
-              <a:blip r:embed="rId3">
+              <a:blip r:embed="rId5">
                 <a:extLst>
                   <a:ext uri="{96DAC541-7B7A-43D3-8B79-37D633B846F1}">
-                    <asvg:svgBlip xmlns:asvg="http://schemas.microsoft.com/office/drawing/2016/SVG/main" r:embed="rId4"/>
+                    <asvg:svgBlip xmlns:asvg="http://schemas.microsoft.com/office/drawing/2016/SVG/main" r:embed="rId6"/>
                   </a:ext>
                 </a:extLst>
               </a:blip>
@@ -13288,10 +13324,10 @@
               <p:nvPr/>
             </p:nvPicPr>
             <p:blipFill>
-              <a:blip r:embed="rId3">
+              <a:blip r:embed="rId5">
                 <a:extLst>
                   <a:ext uri="{96DAC541-7B7A-43D3-8B79-37D633B846F1}">
-                    <asvg:svgBlip xmlns:asvg="http://schemas.microsoft.com/office/drawing/2016/SVG/main" r:embed="rId4"/>
+                    <asvg:svgBlip xmlns:asvg="http://schemas.microsoft.com/office/drawing/2016/SVG/main" r:embed="rId6"/>
                   </a:ext>
                 </a:extLst>
               </a:blip>
@@ -13325,7 +13361,7 @@
           <p:nvPr/>
         </p:nvPicPr>
         <p:blipFill>
-          <a:blip r:embed="rId5">
+          <a:blip r:embed="rId7">
             <a:extLst>
               <a:ext uri="{28A0092B-C50C-407E-A947-70E740481C1C}">
                 <a14:useLocalDpi xmlns:a14="http://schemas.microsoft.com/office/drawing/2010/main" val="0"/>
@@ -13372,7 +13408,7 @@
           <p:nvPr/>
         </p:nvPicPr>
         <p:blipFill>
-          <a:blip r:embed="rId6">
+          <a:blip r:embed="rId8">
             <a:extLst>
               <a:ext uri="{28A0092B-C50C-407E-A947-70E740481C1C}">
                 <a14:useLocalDpi xmlns:a14="http://schemas.microsoft.com/office/drawing/2010/main" val="0"/>
@@ -13486,10 +13522,10 @@
             <p:nvPr/>
           </p:nvPicPr>
           <p:blipFill>
-            <a:blip r:embed="rId7">
+            <a:blip r:embed="rId9">
               <a:extLst>
                 <a:ext uri="{96DAC541-7B7A-43D3-8B79-37D633B846F1}">
-                  <asvg:svgBlip xmlns:asvg="http://schemas.microsoft.com/office/drawing/2016/SVG/main" r:embed="rId8"/>
+                  <asvg:svgBlip xmlns:asvg="http://schemas.microsoft.com/office/drawing/2016/SVG/main" r:embed="rId10"/>
                 </a:ext>
               </a:extLst>
             </a:blip>
@@ -13521,10 +13557,10 @@
             <p:nvPr/>
           </p:nvPicPr>
           <p:blipFill>
-            <a:blip r:embed="rId9">
+            <a:blip r:embed="rId11">
               <a:extLst>
                 <a:ext uri="{96DAC541-7B7A-43D3-8B79-37D633B846F1}">
-                  <asvg:svgBlip xmlns:asvg="http://schemas.microsoft.com/office/drawing/2016/SVG/main" r:embed="rId10"/>
+                  <asvg:svgBlip xmlns:asvg="http://schemas.microsoft.com/office/drawing/2016/SVG/main" r:embed="rId12"/>
                 </a:ext>
               </a:extLst>
             </a:blip>
@@ -13557,10 +13593,10 @@
             <p:nvPr/>
           </p:nvPicPr>
           <p:blipFill>
-            <a:blip r:embed="rId11">
+            <a:blip r:embed="rId13">
               <a:extLst>
                 <a:ext uri="{96DAC541-7B7A-43D3-8B79-37D633B846F1}">
-                  <asvg:svgBlip xmlns:asvg="http://schemas.microsoft.com/office/drawing/2016/SVG/main" r:embed="rId12"/>
+                  <asvg:svgBlip xmlns:asvg="http://schemas.microsoft.com/office/drawing/2016/SVG/main" r:embed="rId14"/>
                 </a:ext>
               </a:extLst>
             </a:blip>
@@ -13739,43 +13775,6 @@
       </p:grpSp>
       <p:pic>
         <p:nvPicPr>
-          <p:cNvPr id="7" name="Graphic 6">
-            <a:extLst>
-              <a:ext uri="{FF2B5EF4-FFF2-40B4-BE49-F238E27FC236}">
-                <a16:creationId xmlns:a16="http://schemas.microsoft.com/office/drawing/2014/main" id="{EB079F8B-4538-B792-904C-F543F3837E3F}"/>
-              </a:ext>
-            </a:extLst>
-          </p:cNvPr>
-          <p:cNvPicPr>
-            <a:picLocks noChangeAspect="1"/>
-          </p:cNvPicPr>
-          <p:nvPr/>
-        </p:nvPicPr>
-        <p:blipFill>
-          <a:blip r:embed="rId13">
-            <a:extLst>
-              <a:ext uri="{96DAC541-7B7A-43D3-8B79-37D633B846F1}">
-                <asvg:svgBlip xmlns:asvg="http://schemas.microsoft.com/office/drawing/2016/SVG/main" r:embed="rId14"/>
-              </a:ext>
-            </a:extLst>
-          </a:blip>
-          <a:srcRect r="7614"/>
-          <a:stretch>
-            <a:fillRect/>
-          </a:stretch>
-        </p:blipFill>
-        <p:spPr>
-          <a:xfrm>
-            <a:off x="-1" y="7952763"/>
-            <a:ext cx="36576001" cy="24965637"/>
-          </a:xfrm>
-          <a:prstGeom prst="rect">
-            <a:avLst/>
-          </a:prstGeom>
-        </p:spPr>
-      </p:pic>
-      <p:pic>
-        <p:nvPicPr>
           <p:cNvPr id="9" name="Graphic 8">
             <a:extLst>
               <a:ext uri="{FF2B5EF4-FFF2-40B4-BE49-F238E27FC236}">
@@ -13802,8 +13801,8 @@
         </p:blipFill>
         <p:spPr>
           <a:xfrm>
-            <a:off x="24868004" y="11588351"/>
-            <a:ext cx="4583885" cy="3997532"/>
+            <a:off x="23404965" y="13248473"/>
+            <a:ext cx="4255635" cy="3711270"/>
           </a:xfrm>
           <a:prstGeom prst="rect">
             <a:avLst/>
@@ -13838,8 +13837,8 @@
         </p:blipFill>
         <p:spPr>
           <a:xfrm>
-            <a:off x="12512041" y="22174276"/>
-            <a:ext cx="4976978" cy="3934437"/>
+            <a:off x="11598495" y="22776062"/>
+            <a:ext cx="4620578" cy="3652692"/>
           </a:xfrm>
           <a:prstGeom prst="rect">
             <a:avLst/>
@@ -13860,8 +13859,8 @@
         </p:nvSpPr>
         <p:spPr>
           <a:xfrm>
-            <a:off x="11338491" y="20805117"/>
-            <a:ext cx="7506958" cy="1323439"/>
+            <a:off x="10515530" y="21466566"/>
+            <a:ext cx="6969387" cy="1169551"/>
           </a:xfrm>
           <a:prstGeom prst="rect">
             <a:avLst/>
@@ -13876,15 +13875,15 @@
           <a:p>
             <a:pPr algn="ctr"/>
             <a:r>
-              <a:rPr lang="en-US" sz="8000" dirty="0"/>
+              <a:rPr lang="en-US" sz="7000" dirty="0"/>
               <a:t>R</a:t>
             </a:r>
             <a:r>
-              <a:rPr lang="en-US" sz="8000" baseline="30000" dirty="0"/>
+              <a:rPr lang="en-US" sz="7000" baseline="30000" dirty="0"/>
               <a:t>2</a:t>
             </a:r>
             <a:r>
-              <a:rPr lang="en-US" sz="8000" dirty="0"/>
+              <a:rPr lang="en-US" sz="7000" dirty="0"/>
               <a:t> = 0.90</a:t>
             </a:r>
           </a:p>
@@ -13904,8 +13903,8 @@
         </p:nvSpPr>
         <p:spPr>
           <a:xfrm>
-            <a:off x="23777722" y="15685501"/>
-            <a:ext cx="6855887" cy="1323439"/>
+            <a:off x="22268963" y="17109564"/>
+            <a:ext cx="6364938" cy="1169551"/>
           </a:xfrm>
           <a:prstGeom prst="rect">
             <a:avLst/>
@@ -13920,15 +13919,15 @@
           <a:p>
             <a:pPr algn="ctr"/>
             <a:r>
-              <a:rPr lang="en-US" sz="8000" dirty="0"/>
+              <a:rPr lang="en-US" sz="7000" dirty="0"/>
               <a:t>R</a:t>
             </a:r>
             <a:r>
-              <a:rPr lang="en-US" sz="8000" baseline="30000" dirty="0"/>
+              <a:rPr lang="en-US" sz="7000" baseline="30000" dirty="0"/>
               <a:t>2</a:t>
             </a:r>
             <a:r>
-              <a:rPr lang="en-US" sz="8000" dirty="0"/>
+              <a:rPr lang="en-US" sz="7000" dirty="0"/>
               <a:t> = 0.34</a:t>
             </a:r>
           </a:p>
@@ -13975,10 +13974,10 @@
       </p:grpSpPr>
       <p:pic>
         <p:nvPicPr>
-          <p:cNvPr id="4" name="Graphic 3">
+          <p:cNvPr id="3" name="Graphic 2">
             <a:extLst>
               <a:ext uri="{FF2B5EF4-FFF2-40B4-BE49-F238E27FC236}">
-                <a16:creationId xmlns:a16="http://schemas.microsoft.com/office/drawing/2014/main" id="{670B353F-2BA5-9C03-38C7-5BC86E242AE9}"/>
+                <a16:creationId xmlns:a16="http://schemas.microsoft.com/office/drawing/2014/main" id="{5A21FE9B-A9F0-51E6-DEF9-2B218382886C}"/>
               </a:ext>
             </a:extLst>
           </p:cNvPr>
@@ -13995,15 +13994,15 @@
               </a:ext>
             </a:extLst>
           </a:blip>
-          <a:srcRect t="26389"/>
+          <a:srcRect l="1875" t="35000" r="9876" b="2361"/>
           <a:stretch>
             <a:fillRect/>
           </a:stretch>
         </p:blipFill>
         <p:spPr>
           <a:xfrm>
-            <a:off x="0" y="8686800"/>
-            <a:ext cx="36576000" cy="24231600"/>
+            <a:off x="0" y="9553278"/>
+            <a:ext cx="36576000" cy="23365122"/>
           </a:xfrm>
           <a:prstGeom prst="rect">
             <a:avLst/>

</xml_diff>